<commit_message>
Updated Day 1 - Slides and Supporting Materials.
</commit_message>
<xml_diff>
--- a/Day 1/Slides/3. What is AWS/what-is-aws-slides.pptx
+++ b/Day 1/Slides/3. What is AWS/what-is-aws-slides.pptx
@@ -5855,24 +5855,6 @@
           </p:spPr>
         </p:pic>
       </p:grpSp>
-      <p:sp>
-        <p:nvSpPr>
-          <p:cNvPr id="8" name="Content Placeholder 7"/>
-          <p:cNvSpPr>
-            <a:spLocks noGrp="1"/>
-          </p:cNvSpPr>
-          <p:nvPr>
-            <p:ph sz="half" idx="3"/>
-          </p:nvPr>
-        </p:nvSpPr>
-        <p:spPr/>
-        <p:txBody>
-          <a:bodyPr/>
-          <a:p>
-            <a:endParaRPr lang="en-US"/>
-          </a:p>
-        </p:txBody>
-      </p:sp>
       <p:sp>
         <p:nvSpPr>
           <p:cNvPr id="5" name="Slide Number Placeholder 4"/>

</xml_diff>